<commit_message>
Update3 Slide Aggiunta grafo soluzione Berlin
</commit_message>
<xml_diff>
--- a/Presentazione Elaborato Ricerca Operativa.pptx
+++ b/Presentazione Elaborato Ricerca Operativa.pptx
@@ -5,10 +5,10 @@
     <p:sldMasterId id="2147483648" r:id="rId1"/>
   </p:sldMasterIdLst>
   <p:notesMasterIdLst>
-    <p:notesMasterId r:id="rId28"/>
+    <p:notesMasterId r:id="rId29"/>
   </p:notesMasterIdLst>
   <p:handoutMasterIdLst>
-    <p:handoutMasterId r:id="rId29"/>
+    <p:handoutMasterId r:id="rId30"/>
   </p:handoutMasterIdLst>
   <p:sldIdLst>
     <p:sldId id="374" r:id="rId2"/>
@@ -36,7 +36,8 @@
     <p:sldId id="691" r:id="rId24"/>
     <p:sldId id="692" r:id="rId25"/>
     <p:sldId id="693" r:id="rId26"/>
-    <p:sldId id="695" r:id="rId27"/>
+    <p:sldId id="709" r:id="rId27"/>
+    <p:sldId id="695" r:id="rId28"/>
   </p:sldIdLst>
   <p:sldSz cx="9144000" cy="6858000" type="screen4x3"/>
   <p:notesSz cx="6858000" cy="9658350"/>
@@ -2857,7 +2858,7 @@
           <a:graphicData uri="http://schemas.openxmlformats.org/presentationml/2006/ole">
             <mc:AlternateContent xmlns:mc="http://schemas.openxmlformats.org/markup-compatibility/2006">
               <mc:Choice xmlns:v="urn:schemas-microsoft-com:vml" Requires="v">
-                <p:oleObj spid="_x0000_s1039" name="Image" r:id="rId11" imgW="2144821" imgH="1268683" progId="Photoshop.Image.7">
+                <p:oleObj spid="_x0000_s1042" name="Image" r:id="rId11" imgW="2144821" imgH="1268683" progId="Photoshop.Image.7">
                   <p:embed/>
                 </p:oleObj>
               </mc:Choice>
@@ -7435,6 +7436,97 @@
           <p:cNvPr id="2" name="Titolo 1">
             <a:extLst>
               <a:ext uri="{FF2B5EF4-FFF2-40B4-BE49-F238E27FC236}">
+                <a16:creationId xmlns:a16="http://schemas.microsoft.com/office/drawing/2014/main" id="{EF381E20-E114-0342-AD91-79B99C513365}"/>
+              </a:ext>
+            </a:extLst>
+          </p:cNvPr>
+          <p:cNvSpPr>
+            <a:spLocks noGrp="1"/>
+          </p:cNvSpPr>
+          <p:nvPr>
+            <p:ph type="title"/>
+          </p:nvPr>
+        </p:nvSpPr>
+        <p:spPr/>
+        <p:txBody>
+          <a:bodyPr/>
+          <a:lstStyle/>
+          <a:p>
+            <a:endParaRPr lang="it-IT"/>
+          </a:p>
+        </p:txBody>
+      </p:sp>
+      <p:pic>
+        <p:nvPicPr>
+          <p:cNvPr id="5" name="Immagine 4">
+            <a:extLst>
+              <a:ext uri="{FF2B5EF4-FFF2-40B4-BE49-F238E27FC236}">
+                <a16:creationId xmlns:a16="http://schemas.microsoft.com/office/drawing/2014/main" id="{10269EBC-A9D7-3B4D-B0E9-A6F3B39031EB}"/>
+              </a:ext>
+            </a:extLst>
+          </p:cNvPr>
+          <p:cNvPicPr>
+            <a:picLocks noChangeAspect="1"/>
+          </p:cNvPicPr>
+          <p:nvPr/>
+        </p:nvPicPr>
+        <p:blipFill>
+          <a:blip r:embed="rId2">
+            <a:extLst>
+              <a:ext uri="{28A0092B-C50C-407E-A947-70E740481C1C}">
+                <a14:useLocalDpi xmlns:a14="http://schemas.microsoft.com/office/drawing/2010/main" val="0"/>
+              </a:ext>
+            </a:extLst>
+          </a:blip>
+          <a:stretch>
+            <a:fillRect/>
+          </a:stretch>
+        </p:blipFill>
+        <p:spPr>
+          <a:xfrm>
+            <a:off x="1651000" y="1686120"/>
+            <a:ext cx="5842000" cy="4381500"/>
+          </a:xfrm>
+          <a:prstGeom prst="rect">
+            <a:avLst/>
+          </a:prstGeom>
+        </p:spPr>
+      </p:pic>
+    </p:spTree>
+    <p:extLst>
+      <p:ext uri="{BB962C8B-B14F-4D97-AF65-F5344CB8AC3E}">
+        <p14:creationId xmlns:p14="http://schemas.microsoft.com/office/powerpoint/2010/main" val="647785659"/>
+      </p:ext>
+    </p:extLst>
+  </p:cSld>
+  <p:clrMapOvr>
+    <a:masterClrMapping/>
+  </p:clrMapOvr>
+</p:sld>
+</file>
+
+<file path=ppt/slides/slide27.xml><?xml version="1.0" encoding="utf-8"?>
+<p:sld xmlns:a="http://schemas.openxmlformats.org/drawingml/2006/main" xmlns:r="http://schemas.openxmlformats.org/officeDocument/2006/relationships" xmlns:p="http://schemas.openxmlformats.org/presentationml/2006/main">
+  <p:cSld>
+    <p:spTree>
+      <p:nvGrpSpPr>
+        <p:cNvPr id="1" name=""/>
+        <p:cNvGrpSpPr/>
+        <p:nvPr/>
+      </p:nvGrpSpPr>
+      <p:grpSpPr>
+        <a:xfrm>
+          <a:off x="0" y="0"/>
+          <a:ext cx="0" cy="0"/>
+          <a:chOff x="0" y="0"/>
+          <a:chExt cx="0" cy="0"/>
+        </a:xfrm>
+      </p:grpSpPr>
+      <p:sp>
+        <p:nvSpPr>
+          <p:cNvPr id="2" name="Titolo 1">
+            <a:extLst>
+              <a:ext uri="{FF2B5EF4-FFF2-40B4-BE49-F238E27FC236}">
                 <a16:creationId xmlns:a16="http://schemas.microsoft.com/office/drawing/2014/main" id="{E204AF64-3FDC-5248-83FE-F153C689C145}"/>
               </a:ext>
             </a:extLst>
@@ -7482,12 +7574,6 @@
             <a:r>
               <a:rPr lang="it-IT" dirty="0"/>
               <a:t>DA AGGIUNGERE:</a:t>
-            </a:r>
-          </a:p>
-          <a:p>
-            <a:r>
-              <a:rPr lang="it-IT" dirty="0"/>
-              <a:t>GRAFICO SOLUZIONE </a:t>
             </a:r>
           </a:p>
           <a:p>

</xml_diff>

<commit_message>
Cambiamento slide 2-opt arco (2, 0) e arco (4, 0) al posto di arco (0, 2) e arco (0, 4)
</commit_message>
<xml_diff>
--- a/Presentazione Elaborato Ricerca Operativa.pptx
+++ b/Presentazione Elaborato Ricerca Operativa.pptx
@@ -199,7 +199,7 @@
   <pc:docChgLst>
     <pc:chgData name="MICHELE MARESCA" userId="a404185f-7c0c-41c8-aca6-b938107372a7" providerId="ADAL" clId="{59B38A33-1A60-9949-9243-8ABB59DA001A}"/>
     <pc:docChg chg="delSld modSld">
-      <pc:chgData name="MICHELE MARESCA" userId="a404185f-7c0c-41c8-aca6-b938107372a7" providerId="ADAL" clId="{59B38A33-1A60-9949-9243-8ABB59DA001A}" dt="2021-06-06T09:58:02.797" v="86" actId="20577"/>
+      <pc:chgData name="MICHELE MARESCA" userId="a404185f-7c0c-41c8-aca6-b938107372a7" providerId="ADAL" clId="{59B38A33-1A60-9949-9243-8ABB59DA001A}" dt="2021-06-06T10:46:24.500" v="94" actId="20577"/>
       <pc:docMkLst>
         <pc:docMk/>
       </pc:docMkLst>
@@ -215,6 +215,21 @@
             <pc:docMk/>
             <pc:sldMk cId="1925807012" sldId="700"/>
             <ac:spMk id="11" creationId="{038A17F2-BC94-44A7-AEF4-C8EF3981602F}"/>
+          </ac:spMkLst>
+        </pc:spChg>
+      </pc:sldChg>
+      <pc:sldChg chg="modSp mod">
+        <pc:chgData name="MICHELE MARESCA" userId="a404185f-7c0c-41c8-aca6-b938107372a7" providerId="ADAL" clId="{59B38A33-1A60-9949-9243-8ABB59DA001A}" dt="2021-06-06T10:46:24.500" v="94" actId="20577"/>
+        <pc:sldMkLst>
+          <pc:docMk/>
+          <pc:sldMk cId="3838491244" sldId="702"/>
+        </pc:sldMkLst>
+        <pc:spChg chg="mod">
+          <ac:chgData name="MICHELE MARESCA" userId="a404185f-7c0c-41c8-aca6-b938107372a7" providerId="ADAL" clId="{59B38A33-1A60-9949-9243-8ABB59DA001A}" dt="2021-06-06T10:46:24.500" v="94" actId="20577"/>
+          <ac:spMkLst>
+            <pc:docMk/>
+            <pc:sldMk cId="3838491244" sldId="702"/>
+            <ac:spMk id="7" creationId="{E4932937-7FC9-492A-A63F-BF0137D2D51D}"/>
           </ac:spMkLst>
         </pc:spChg>
       </pc:sldChg>
@@ -6191,8 +6206,13 @@
             </a:pPr>
             <a:r>
               <a:rPr lang="it-IT" sz="1600" b="0" dirty="0"/>
-              <a:t>Sceglie una coppia di archi non adiacenti es. (3,4) e (0,2);</a:t>
+              <a:t>Sceglie una coppia di archi non adiacenti es. (3,4) </a:t>
             </a:r>
+            <a:r>
+              <a:rPr lang="it-IT" sz="1600" b="0"/>
+              <a:t>e (2,0);</a:t>
+            </a:r>
+            <a:endParaRPr lang="it-IT" sz="1600" b="0" dirty="0"/>
           </a:p>
           <a:p>
             <a:pPr marL="342900" indent="-342900">
@@ -6225,7 +6245,7 @@
             </a:pPr>
             <a:r>
               <a:rPr lang="it-IT" sz="1600" b="0" dirty="0"/>
-              <a:t>Aggiunge i nuovi archi es. (3,2) e (0,4).</a:t>
+              <a:t>Aggiunge i nuovi archi es. (3,2) e (4,0).</a:t>
             </a:r>
           </a:p>
         </p:txBody>

</xml_diff>

<commit_message>
Correzione 2-opt candidate[i:j+1], corretto anche a slide
</commit_message>
<xml_diff>
--- a/Presentazione Elaborato Ricerca Operativa.pptx
+++ b/Presentazione Elaborato Ricerca Operativa.pptx
@@ -199,10 +199,33 @@
   <pc:docChgLst>
     <pc:chgData name="MICHELE MARESCA" userId="a404185f-7c0c-41c8-aca6-b938107372a7" providerId="ADAL" clId="{59B38A33-1A60-9949-9243-8ABB59DA001A}"/>
     <pc:docChg chg="delSld modSld">
-      <pc:chgData name="MICHELE MARESCA" userId="a404185f-7c0c-41c8-aca6-b938107372a7" providerId="ADAL" clId="{59B38A33-1A60-9949-9243-8ABB59DA001A}" dt="2021-06-06T10:46:24.500" v="94" actId="20577"/>
+      <pc:chgData name="MICHELE MARESCA" userId="a404185f-7c0c-41c8-aca6-b938107372a7" providerId="ADAL" clId="{59B38A33-1A60-9949-9243-8ABB59DA001A}" dt="2021-06-06T11:03:53.753" v="98" actId="1076"/>
       <pc:docMkLst>
         <pc:docMk/>
       </pc:docMkLst>
+      <pc:sldChg chg="addSp delSp modSp mod">
+        <pc:chgData name="MICHELE MARESCA" userId="a404185f-7c0c-41c8-aca6-b938107372a7" providerId="ADAL" clId="{59B38A33-1A60-9949-9243-8ABB59DA001A}" dt="2021-06-06T11:03:53.753" v="98" actId="1076"/>
+        <pc:sldMkLst>
+          <pc:docMk/>
+          <pc:sldMk cId="3162308186" sldId="699"/>
+        </pc:sldMkLst>
+        <pc:picChg chg="add mod">
+          <ac:chgData name="MICHELE MARESCA" userId="a404185f-7c0c-41c8-aca6-b938107372a7" providerId="ADAL" clId="{59B38A33-1A60-9949-9243-8ABB59DA001A}" dt="2021-06-06T11:03:53.753" v="98" actId="1076"/>
+          <ac:picMkLst>
+            <pc:docMk/>
+            <pc:sldMk cId="3162308186" sldId="699"/>
+            <ac:picMk id="2" creationId="{ED3BBE07-BE22-1642-BFB6-F1833694861F}"/>
+          </ac:picMkLst>
+        </pc:picChg>
+        <pc:picChg chg="del">
+          <ac:chgData name="MICHELE MARESCA" userId="a404185f-7c0c-41c8-aca6-b938107372a7" providerId="ADAL" clId="{59B38A33-1A60-9949-9243-8ABB59DA001A}" dt="2021-06-06T11:03:44.638" v="95" actId="478"/>
+          <ac:picMkLst>
+            <pc:docMk/>
+            <pc:sldMk cId="3162308186" sldId="699"/>
+            <ac:picMk id="6" creationId="{CD0ABACA-FA79-4C98-8F91-07E09566C9FF}"/>
+          </ac:picMkLst>
+        </pc:picChg>
+      </pc:sldChg>
       <pc:sldChg chg="modSp mod">
         <pc:chgData name="MICHELE MARESCA" userId="a404185f-7c0c-41c8-aca6-b938107372a7" providerId="ADAL" clId="{59B38A33-1A60-9949-9243-8ABB59DA001A}" dt="2021-06-06T09:21:54.763" v="1" actId="20577"/>
         <pc:sldMkLst>
@@ -6206,13 +6229,8 @@
             </a:pPr>
             <a:r>
               <a:rPr lang="it-IT" sz="1600" b="0" dirty="0"/>
-              <a:t>Sceglie una coppia di archi non adiacenti es. (3,4) </a:t>
+              <a:t>Sceglie una coppia di archi non adiacenti es. (3,4) e (2,0);</a:t>
             </a:r>
-            <a:r>
-              <a:rPr lang="it-IT" sz="1600" b="0"/>
-              <a:t>e (2,0);</a:t>
-            </a:r>
-            <a:endParaRPr lang="it-IT" sz="1600" b="0" dirty="0"/>
           </a:p>
           <a:p>
             <a:pPr marL="342900" indent="-342900">
@@ -6984,10 +7002,10 @@
       </p:sp>
       <p:pic>
         <p:nvPicPr>
-          <p:cNvPr id="6" name="Segnaposto contenuto 3">
+          <p:cNvPr id="2" name="Immagine 1">
             <a:extLst>
               <a:ext uri="{FF2B5EF4-FFF2-40B4-BE49-F238E27FC236}">
-                <a16:creationId xmlns:a16="http://schemas.microsoft.com/office/drawing/2014/main" id="{CD0ABACA-FA79-4C98-8F91-07E09566C9FF}"/>
+                <a16:creationId xmlns:a16="http://schemas.microsoft.com/office/drawing/2014/main" id="{ED3BBE07-BE22-1642-BFB6-F1833694861F}"/>
               </a:ext>
             </a:extLst>
           </p:cNvPr>
@@ -7002,47 +7020,14 @@
             <a:fillRect/>
           </a:stretch>
         </p:blipFill>
-        <p:spPr bwMode="auto">
+        <p:spPr>
           <a:xfrm>
-            <a:off x="685800" y="2703975"/>
-            <a:ext cx="7772400" cy="2908461"/>
+            <a:off x="577850" y="2692281"/>
+            <a:ext cx="7988300" cy="3060700"/>
           </a:xfrm>
           <a:prstGeom prst="rect">
             <a:avLst/>
           </a:prstGeom>
-          <a:noFill/>
-          <a:ln>
-            <a:noFill/>
-          </a:ln>
-          <a:effectLst/>
-          <a:extLst>
-            <a:ext uri="{909E8E84-426E-40DD-AFC4-6F175D3DCCD1}">
-              <a14:hiddenFill xmlns:a14="http://schemas.microsoft.com/office/drawing/2010/main">
-                <a:solidFill>
-                  <a:schemeClr val="accent1"/>
-                </a:solidFill>
-              </a14:hiddenFill>
-            </a:ext>
-            <a:ext uri="{91240B29-F687-4F45-9708-019B960494DF}">
-              <a14:hiddenLine xmlns:a14="http://schemas.microsoft.com/office/drawing/2010/main" w="9525">
-                <a:solidFill>
-                  <a:schemeClr val="tx1"/>
-                </a:solidFill>
-                <a:miter lim="800000"/>
-                <a:headEnd/>
-                <a:tailEnd/>
-              </a14:hiddenLine>
-            </a:ext>
-            <a:ext uri="{AF507438-7753-43E0-B8FC-AC1667EBCBE1}">
-              <a14:hiddenEffects xmlns:a14="http://schemas.microsoft.com/office/drawing/2010/main">
-                <a:effectLst>
-                  <a:outerShdw dist="35921" dir="2700000" algn="ctr" rotWithShape="0">
-                    <a:schemeClr val="bg2"/>
-                  </a:outerShdw>
-                </a:effectLst>
-              </a14:hiddenEffects>
-            </a:ext>
-          </a:extLst>
         </p:spPr>
       </p:pic>
     </p:spTree>

</xml_diff>

<commit_message>
Correzione 2-opt candidate[i:j+1], corretto anche a slide anche a TSP_random.py
</commit_message>
<xml_diff>
--- a/Presentazione Elaborato Ricerca Operativa.pptx
+++ b/Presentazione Elaborato Ricerca Operativa.pptx
@@ -199,18 +199,18 @@
   <pc:docChgLst>
     <pc:chgData name="MICHELE MARESCA" userId="a404185f-7c0c-41c8-aca6-b938107372a7" providerId="ADAL" clId="{59B38A33-1A60-9949-9243-8ABB59DA001A}"/>
     <pc:docChg chg="delSld modSld">
-      <pc:chgData name="MICHELE MARESCA" userId="a404185f-7c0c-41c8-aca6-b938107372a7" providerId="ADAL" clId="{59B38A33-1A60-9949-9243-8ABB59DA001A}" dt="2021-06-06T11:03:53.753" v="98" actId="1076"/>
+      <pc:chgData name="MICHELE MARESCA" userId="a404185f-7c0c-41c8-aca6-b938107372a7" providerId="ADAL" clId="{59B38A33-1A60-9949-9243-8ABB59DA001A}" dt="2021-06-06T11:12:40.024" v="119" actId="14100"/>
       <pc:docMkLst>
         <pc:docMk/>
       </pc:docMkLst>
       <pc:sldChg chg="addSp delSp modSp mod">
-        <pc:chgData name="MICHELE MARESCA" userId="a404185f-7c0c-41c8-aca6-b938107372a7" providerId="ADAL" clId="{59B38A33-1A60-9949-9243-8ABB59DA001A}" dt="2021-06-06T11:03:53.753" v="98" actId="1076"/>
+        <pc:chgData name="MICHELE MARESCA" userId="a404185f-7c0c-41c8-aca6-b938107372a7" providerId="ADAL" clId="{59B38A33-1A60-9949-9243-8ABB59DA001A}" dt="2021-06-06T11:12:40.024" v="119" actId="14100"/>
         <pc:sldMkLst>
           <pc:docMk/>
           <pc:sldMk cId="3162308186" sldId="699"/>
         </pc:sldMkLst>
         <pc:picChg chg="add mod">
-          <ac:chgData name="MICHELE MARESCA" userId="a404185f-7c0c-41c8-aca6-b938107372a7" providerId="ADAL" clId="{59B38A33-1A60-9949-9243-8ABB59DA001A}" dt="2021-06-06T11:03:53.753" v="98" actId="1076"/>
+          <ac:chgData name="MICHELE MARESCA" userId="a404185f-7c0c-41c8-aca6-b938107372a7" providerId="ADAL" clId="{59B38A33-1A60-9949-9243-8ABB59DA001A}" dt="2021-06-06T11:12:40.024" v="119" actId="14100"/>
           <ac:picMkLst>
             <pc:docMk/>
             <pc:sldMk cId="3162308186" sldId="699"/>
@@ -242,17 +242,25 @@
         </pc:spChg>
       </pc:sldChg>
       <pc:sldChg chg="modSp mod">
-        <pc:chgData name="MICHELE MARESCA" userId="a404185f-7c0c-41c8-aca6-b938107372a7" providerId="ADAL" clId="{59B38A33-1A60-9949-9243-8ABB59DA001A}" dt="2021-06-06T10:46:24.500" v="94" actId="20577"/>
+        <pc:chgData name="MICHELE MARESCA" userId="a404185f-7c0c-41c8-aca6-b938107372a7" providerId="ADAL" clId="{59B38A33-1A60-9949-9243-8ABB59DA001A}" dt="2021-06-06T11:11:45.407" v="116" actId="20577"/>
         <pc:sldMkLst>
           <pc:docMk/>
           <pc:sldMk cId="3838491244" sldId="702"/>
         </pc:sldMkLst>
         <pc:spChg chg="mod">
-          <ac:chgData name="MICHELE MARESCA" userId="a404185f-7c0c-41c8-aca6-b938107372a7" providerId="ADAL" clId="{59B38A33-1A60-9949-9243-8ABB59DA001A}" dt="2021-06-06T10:46:24.500" v="94" actId="20577"/>
+          <ac:chgData name="MICHELE MARESCA" userId="a404185f-7c0c-41c8-aca6-b938107372a7" providerId="ADAL" clId="{59B38A33-1A60-9949-9243-8ABB59DA001A}" dt="2021-06-06T11:11:45.407" v="116" actId="20577"/>
           <ac:spMkLst>
             <pc:docMk/>
             <pc:sldMk cId="3838491244" sldId="702"/>
             <ac:spMk id="7" creationId="{E4932937-7FC9-492A-A63F-BF0137D2D51D}"/>
+          </ac:spMkLst>
+        </pc:spChg>
+        <pc:spChg chg="mod">
+          <ac:chgData name="MICHELE MARESCA" userId="a404185f-7c0c-41c8-aca6-b938107372a7" providerId="ADAL" clId="{59B38A33-1A60-9949-9243-8ABB59DA001A}" dt="2021-06-06T11:11:00.311" v="108" actId="20577"/>
+          <ac:spMkLst>
+            <pc:docMk/>
+            <pc:sldMk cId="3838491244" sldId="702"/>
+            <ac:spMk id="16" creationId="{CD358164-AEE0-46B1-8A24-2545F14BB558}"/>
           </ac:spMkLst>
         </pc:spChg>
       </pc:sldChg>
@@ -6229,7 +6237,7 @@
             </a:pPr>
             <a:r>
               <a:rPr lang="it-IT" sz="1600" b="0" dirty="0"/>
-              <a:t>Sceglie una coppia di archi non adiacenti es. (3,4) e (2,0);</a:t>
+              <a:t>Sceglie una coppia di archi non adiacenti es. (4,3) e (2,0);</a:t>
             </a:r>
           </a:p>
           <a:p>
@@ -6263,7 +6271,7 @@
             </a:pPr>
             <a:r>
               <a:rPr lang="it-IT" sz="1600" b="0" dirty="0"/>
-              <a:t>Aggiunge i nuovi archi es. (3,2) e (4,0).</a:t>
+              <a:t>Aggiunge i nuovi archi es. (2,3) e (4,0).</a:t>
             </a:r>
           </a:p>
         </p:txBody>
@@ -6663,7 +6671,7 @@
           <a:p>
             <a:r>
               <a:rPr lang="it-IT" sz="1600" b="0" dirty="0"/>
-              <a:t>[0, 1, 3, 4, 2]</a:t>
+              <a:t>[1, 3, 4, 2, 0]</a:t>
             </a:r>
           </a:p>
           <a:p>
@@ -7022,8 +7030,8 @@
         </p:blipFill>
         <p:spPr>
           <a:xfrm>
-            <a:off x="577850" y="2692281"/>
-            <a:ext cx="7988300" cy="3060700"/>
+            <a:off x="1183554" y="2924355"/>
+            <a:ext cx="6741428" cy="2582964"/>
           </a:xfrm>
           <a:prstGeom prst="rect">
             <a:avLst/>

</xml_diff>